<commit_message>
Atualiza slides unit test tools
</commit_message>
<xml_diff>
--- a/projects/01-introducao-tdd/unit-test-tools.pptx
+++ b/projects/01-introducao-tdd/unit-test-tools.pptx
@@ -261,7 +261,7 @@
           <a:p>
             <a:fld id="{D27E2AE0-7677-624F-BA46-7784ADF731BA}" type="datetimeFigureOut">
               <a:rPr lang="en-BR" smtClean="0"/>
-              <a:t>14/12/20</a:t>
+              <a:t>16/11/21</a:t>
             </a:fld>
             <a:endParaRPr lang="en-BR"/>
           </a:p>
@@ -461,7 +461,7 @@
           <a:p>
             <a:fld id="{D27E2AE0-7677-624F-BA46-7784ADF731BA}" type="datetimeFigureOut">
               <a:rPr lang="en-BR" smtClean="0"/>
-              <a:t>14/12/20</a:t>
+              <a:t>16/11/21</a:t>
             </a:fld>
             <a:endParaRPr lang="en-BR"/>
           </a:p>
@@ -671,7 +671,7 @@
           <a:p>
             <a:fld id="{D27E2AE0-7677-624F-BA46-7784ADF731BA}" type="datetimeFigureOut">
               <a:rPr lang="en-BR" smtClean="0"/>
-              <a:t>14/12/20</a:t>
+              <a:t>16/11/21</a:t>
             </a:fld>
             <a:endParaRPr lang="en-BR"/>
           </a:p>
@@ -871,7 +871,7 @@
           <a:p>
             <a:fld id="{D27E2AE0-7677-624F-BA46-7784ADF731BA}" type="datetimeFigureOut">
               <a:rPr lang="en-BR" smtClean="0"/>
-              <a:t>14/12/20</a:t>
+              <a:t>16/11/21</a:t>
             </a:fld>
             <a:endParaRPr lang="en-BR"/>
           </a:p>
@@ -1147,7 +1147,7 @@
           <a:p>
             <a:fld id="{D27E2AE0-7677-624F-BA46-7784ADF731BA}" type="datetimeFigureOut">
               <a:rPr lang="en-BR" smtClean="0"/>
-              <a:t>14/12/20</a:t>
+              <a:t>16/11/21</a:t>
             </a:fld>
             <a:endParaRPr lang="en-BR"/>
           </a:p>
@@ -1415,7 +1415,7 @@
           <a:p>
             <a:fld id="{D27E2AE0-7677-624F-BA46-7784ADF731BA}" type="datetimeFigureOut">
               <a:rPr lang="en-BR" smtClean="0"/>
-              <a:t>14/12/20</a:t>
+              <a:t>16/11/21</a:t>
             </a:fld>
             <a:endParaRPr lang="en-BR"/>
           </a:p>
@@ -1830,7 +1830,7 @@
           <a:p>
             <a:fld id="{D27E2AE0-7677-624F-BA46-7784ADF731BA}" type="datetimeFigureOut">
               <a:rPr lang="en-BR" smtClean="0"/>
-              <a:t>14/12/20</a:t>
+              <a:t>16/11/21</a:t>
             </a:fld>
             <a:endParaRPr lang="en-BR"/>
           </a:p>
@@ -1972,7 +1972,7 @@
           <a:p>
             <a:fld id="{D27E2AE0-7677-624F-BA46-7784ADF731BA}" type="datetimeFigureOut">
               <a:rPr lang="en-BR" smtClean="0"/>
-              <a:t>14/12/20</a:t>
+              <a:t>16/11/21</a:t>
             </a:fld>
             <a:endParaRPr lang="en-BR"/>
           </a:p>
@@ -2085,7 +2085,7 @@
           <a:p>
             <a:fld id="{D27E2AE0-7677-624F-BA46-7784ADF731BA}" type="datetimeFigureOut">
               <a:rPr lang="en-BR" smtClean="0"/>
-              <a:t>14/12/20</a:t>
+              <a:t>16/11/21</a:t>
             </a:fld>
             <a:endParaRPr lang="en-BR"/>
           </a:p>
@@ -2398,7 +2398,7 @@
           <a:p>
             <a:fld id="{D27E2AE0-7677-624F-BA46-7784ADF731BA}" type="datetimeFigureOut">
               <a:rPr lang="en-BR" smtClean="0"/>
-              <a:t>14/12/20</a:t>
+              <a:t>16/11/21</a:t>
             </a:fld>
             <a:endParaRPr lang="en-BR"/>
           </a:p>
@@ -2687,7 +2687,7 @@
           <a:p>
             <a:fld id="{D27E2AE0-7677-624F-BA46-7784ADF731BA}" type="datetimeFigureOut">
               <a:rPr lang="en-BR" smtClean="0"/>
-              <a:t>14/12/20</a:t>
+              <a:t>16/11/21</a:t>
             </a:fld>
             <a:endParaRPr lang="en-BR"/>
           </a:p>
@@ -2930,7 +2930,7 @@
           <a:p>
             <a:fld id="{D27E2AE0-7677-624F-BA46-7784ADF731BA}" type="datetimeFigureOut">
               <a:rPr lang="en-BR" smtClean="0"/>
-              <a:t>14/12/20</a:t>
+              <a:t>16/11/21</a:t>
             </a:fld>
             <a:endParaRPr lang="en-BR"/>
           </a:p>
@@ -3823,6 +3823,110 @@
           </a:p>
         </p:txBody>
       </p:sp>
+      <p:sp>
+        <p:nvSpPr>
+          <p:cNvPr id="3" name="Rectangle 2">
+            <a:extLst>
+              <a:ext uri="{FF2B5EF4-FFF2-40B4-BE49-F238E27FC236}">
+                <a16:creationId xmlns:a16="http://schemas.microsoft.com/office/drawing/2014/main" id="{409D6D8F-789F-0945-AA95-39BDBA76A3FA}"/>
+              </a:ext>
+            </a:extLst>
+          </p:cNvPr>
+          <p:cNvSpPr/>
+          <p:nvPr/>
+        </p:nvSpPr>
+        <p:spPr>
+          <a:xfrm>
+            <a:off x="5151091" y="4350181"/>
+            <a:ext cx="322430" cy="324850"/>
+          </a:xfrm>
+          <a:prstGeom prst="rect">
+            <a:avLst/>
+          </a:prstGeom>
+          <a:solidFill>
+            <a:schemeClr val="bg1"/>
+          </a:solidFill>
+          <a:ln>
+            <a:noFill/>
+          </a:ln>
+        </p:spPr>
+        <p:style>
+          <a:lnRef idx="2">
+            <a:schemeClr val="accent1">
+              <a:shade val="50000"/>
+            </a:schemeClr>
+          </a:lnRef>
+          <a:fillRef idx="1">
+            <a:schemeClr val="accent1"/>
+          </a:fillRef>
+          <a:effectRef idx="0">
+            <a:schemeClr val="accent1"/>
+          </a:effectRef>
+          <a:fontRef idx="minor">
+            <a:schemeClr val="lt1"/>
+          </a:fontRef>
+        </p:style>
+        <p:txBody>
+          <a:bodyPr rtlCol="0" anchor="ctr"/>
+          <a:lstStyle/>
+          <a:p>
+            <a:pPr algn="ctr"/>
+            <a:endParaRPr lang="en-BR"/>
+          </a:p>
+        </p:txBody>
+      </p:sp>
+      <p:sp>
+        <p:nvSpPr>
+          <p:cNvPr id="18" name="Rectangle 17">
+            <a:extLst>
+              <a:ext uri="{FF2B5EF4-FFF2-40B4-BE49-F238E27FC236}">
+                <a16:creationId xmlns:a16="http://schemas.microsoft.com/office/drawing/2014/main" id="{030860D9-5FC6-C743-BF69-E42229A3B2AB}"/>
+              </a:ext>
+            </a:extLst>
+          </p:cNvPr>
+          <p:cNvSpPr/>
+          <p:nvPr/>
+        </p:nvSpPr>
+        <p:spPr>
+          <a:xfrm>
+            <a:off x="2076058" y="4608587"/>
+            <a:ext cx="322430" cy="324850"/>
+          </a:xfrm>
+          <a:prstGeom prst="rect">
+            <a:avLst/>
+          </a:prstGeom>
+          <a:solidFill>
+            <a:schemeClr val="bg1"/>
+          </a:solidFill>
+          <a:ln>
+            <a:noFill/>
+          </a:ln>
+        </p:spPr>
+        <p:style>
+          <a:lnRef idx="2">
+            <a:schemeClr val="accent1">
+              <a:shade val="50000"/>
+            </a:schemeClr>
+          </a:lnRef>
+          <a:fillRef idx="1">
+            <a:schemeClr val="accent1"/>
+          </a:fillRef>
+          <a:effectRef idx="0">
+            <a:schemeClr val="accent1"/>
+          </a:effectRef>
+          <a:fontRef idx="minor">
+            <a:schemeClr val="lt1"/>
+          </a:fontRef>
+        </p:style>
+        <p:txBody>
+          <a:bodyPr rtlCol="0" anchor="ctr"/>
+          <a:lstStyle/>
+          <a:p>
+            <a:pPr algn="ctr"/>
+            <a:endParaRPr lang="en-BR"/>
+          </a:p>
+        </p:txBody>
+      </p:sp>
     </p:spTree>
     <p:extLst>
       <p:ext uri="{BB962C8B-B14F-4D97-AF65-F5344CB8AC3E}">

</xml_diff>